<commit_message>
update lectures in dl
</commit_message>
<xml_diff>
--- a/year 3/Deep learning and Natural Language Processing/Lectures/1-Introduction.pptx
+++ b/year 3/Deep learning and Natural Language Processing/Lectures/1-Introduction.pptx
@@ -238,7 +238,7 @@
           <a:p>
             <a:fld id="{69FA5694-CB6C-49FC-88BD-B2801DB92BC5}" type="datetimeFigureOut">
               <a:rPr lang="en-US" smtClean="0"/>
-              <a:t>10/10/2021</a:t>
+              <a:t>10/18/2022</a:t>
             </a:fld>
             <a:endParaRPr lang="en-US"/>
           </a:p>
@@ -609,6 +609,513 @@
 </p:notes>
 </file>
 
+<file path=ppt/notesSlides/notesSlide10.xml><?xml version="1.0" encoding="utf-8"?>
+<p:notes xmlns:a="http://schemas.openxmlformats.org/drawingml/2006/main" xmlns:r="http://schemas.openxmlformats.org/officeDocument/2006/relationships" xmlns:p="http://schemas.openxmlformats.org/presentationml/2006/main">
+  <p:cSld>
+    <p:spTree>
+      <p:nvGrpSpPr>
+        <p:cNvPr id="1" name=""/>
+        <p:cNvGrpSpPr/>
+        <p:nvPr/>
+      </p:nvGrpSpPr>
+      <p:grpSpPr>
+        <a:xfrm>
+          <a:off x="0" y="0"/>
+          <a:ext cx="0" cy="0"/>
+          <a:chOff x="0" y="0"/>
+          <a:chExt cx="0" cy="0"/>
+        </a:xfrm>
+      </p:grpSpPr>
+      <p:sp>
+        <p:nvSpPr>
+          <p:cNvPr id="2" name="מציין מיקום של תמונת שקופית 1"/>
+          <p:cNvSpPr>
+            <a:spLocks noGrp="1" noRot="1" noChangeAspect="1"/>
+          </p:cNvSpPr>
+          <p:nvPr>
+            <p:ph type="sldImg"/>
+          </p:nvPr>
+        </p:nvSpPr>
+        <p:spPr/>
+      </p:sp>
+      <p:sp>
+        <p:nvSpPr>
+          <p:cNvPr id="3" name="מציין מיקום של הערות 2"/>
+          <p:cNvSpPr>
+            <a:spLocks noGrp="1"/>
+          </p:cNvSpPr>
+          <p:nvPr>
+            <p:ph type="body" idx="1"/>
+          </p:nvPr>
+        </p:nvSpPr>
+        <p:spPr/>
+        <p:txBody>
+          <a:bodyPr/>
+          <a:lstStyle/>
+          <a:p>
+            <a:endParaRPr lang="en-IL" dirty="0"/>
+          </a:p>
+        </p:txBody>
+      </p:sp>
+      <p:sp>
+        <p:nvSpPr>
+          <p:cNvPr id="4" name="מציין מיקום של מספר שקופית 3"/>
+          <p:cNvSpPr>
+            <a:spLocks noGrp="1"/>
+          </p:cNvSpPr>
+          <p:nvPr>
+            <p:ph type="sldNum" sz="quarter" idx="5"/>
+          </p:nvPr>
+        </p:nvSpPr>
+        <p:spPr/>
+        <p:txBody>
+          <a:bodyPr/>
+          <a:lstStyle/>
+          <a:p>
+            <a:fld id="{F62FA818-9C27-49D4-BE3F-39305D92C786}" type="slidenum">
+              <a:rPr lang="en-US" smtClean="0"/>
+              <a:t>26</a:t>
+            </a:fld>
+            <a:endParaRPr lang="en-US"/>
+          </a:p>
+        </p:txBody>
+      </p:sp>
+    </p:spTree>
+    <p:extLst>
+      <p:ext uri="{BB962C8B-B14F-4D97-AF65-F5344CB8AC3E}">
+        <p14:creationId xmlns:p14="http://schemas.microsoft.com/office/powerpoint/2010/main" val="1526995307"/>
+      </p:ext>
+    </p:extLst>
+  </p:cSld>
+  <p:clrMapOvr>
+    <a:masterClrMapping/>
+  </p:clrMapOvr>
+</p:notes>
+</file>
+
+<file path=ppt/notesSlides/notesSlide11.xml><?xml version="1.0" encoding="utf-8"?>
+<p:notes xmlns:a="http://schemas.openxmlformats.org/drawingml/2006/main" xmlns:r="http://schemas.openxmlformats.org/officeDocument/2006/relationships" xmlns:p="http://schemas.openxmlformats.org/presentationml/2006/main">
+  <p:cSld>
+    <p:spTree>
+      <p:nvGrpSpPr>
+        <p:cNvPr id="1" name=""/>
+        <p:cNvGrpSpPr/>
+        <p:nvPr/>
+      </p:nvGrpSpPr>
+      <p:grpSpPr>
+        <a:xfrm>
+          <a:off x="0" y="0"/>
+          <a:ext cx="0" cy="0"/>
+          <a:chOff x="0" y="0"/>
+          <a:chExt cx="0" cy="0"/>
+        </a:xfrm>
+      </p:grpSpPr>
+      <p:sp>
+        <p:nvSpPr>
+          <p:cNvPr id="2" name="מציין מיקום של תמונת שקופית 1"/>
+          <p:cNvSpPr>
+            <a:spLocks noGrp="1" noRot="1" noChangeAspect="1"/>
+          </p:cNvSpPr>
+          <p:nvPr>
+            <p:ph type="sldImg"/>
+          </p:nvPr>
+        </p:nvSpPr>
+        <p:spPr/>
+      </p:sp>
+      <p:sp>
+        <p:nvSpPr>
+          <p:cNvPr id="3" name="מציין מיקום של הערות 2"/>
+          <p:cNvSpPr>
+            <a:spLocks noGrp="1"/>
+          </p:cNvSpPr>
+          <p:nvPr>
+            <p:ph type="body" idx="1"/>
+          </p:nvPr>
+        </p:nvSpPr>
+        <p:spPr/>
+        <p:txBody>
+          <a:bodyPr/>
+          <a:lstStyle/>
+          <a:p>
+            <a:endParaRPr lang="en-IL" dirty="0"/>
+          </a:p>
+        </p:txBody>
+      </p:sp>
+      <p:sp>
+        <p:nvSpPr>
+          <p:cNvPr id="4" name="מציין מיקום של מספר שקופית 3"/>
+          <p:cNvSpPr>
+            <a:spLocks noGrp="1"/>
+          </p:cNvSpPr>
+          <p:nvPr>
+            <p:ph type="sldNum" sz="quarter" idx="5"/>
+          </p:nvPr>
+        </p:nvSpPr>
+        <p:spPr/>
+        <p:txBody>
+          <a:bodyPr/>
+          <a:lstStyle/>
+          <a:p>
+            <a:fld id="{F62FA818-9C27-49D4-BE3F-39305D92C786}" type="slidenum">
+              <a:rPr lang="en-US" smtClean="0"/>
+              <a:t>27</a:t>
+            </a:fld>
+            <a:endParaRPr lang="en-US"/>
+          </a:p>
+        </p:txBody>
+      </p:sp>
+    </p:spTree>
+    <p:extLst>
+      <p:ext uri="{BB962C8B-B14F-4D97-AF65-F5344CB8AC3E}">
+        <p14:creationId xmlns:p14="http://schemas.microsoft.com/office/powerpoint/2010/main" val="4011924387"/>
+      </p:ext>
+    </p:extLst>
+  </p:cSld>
+  <p:clrMapOvr>
+    <a:masterClrMapping/>
+  </p:clrMapOvr>
+</p:notes>
+</file>
+
+<file path=ppt/notesSlides/notesSlide12.xml><?xml version="1.0" encoding="utf-8"?>
+<p:notes xmlns:a="http://schemas.openxmlformats.org/drawingml/2006/main" xmlns:r="http://schemas.openxmlformats.org/officeDocument/2006/relationships" xmlns:p="http://schemas.openxmlformats.org/presentationml/2006/main">
+  <p:cSld>
+    <p:spTree>
+      <p:nvGrpSpPr>
+        <p:cNvPr id="1" name=""/>
+        <p:cNvGrpSpPr/>
+        <p:nvPr/>
+      </p:nvGrpSpPr>
+      <p:grpSpPr>
+        <a:xfrm>
+          <a:off x="0" y="0"/>
+          <a:ext cx="0" cy="0"/>
+          <a:chOff x="0" y="0"/>
+          <a:chExt cx="0" cy="0"/>
+        </a:xfrm>
+      </p:grpSpPr>
+      <p:sp>
+        <p:nvSpPr>
+          <p:cNvPr id="2" name="מציין מיקום של תמונת שקופית 1"/>
+          <p:cNvSpPr>
+            <a:spLocks noGrp="1" noRot="1" noChangeAspect="1"/>
+          </p:cNvSpPr>
+          <p:nvPr>
+            <p:ph type="sldImg"/>
+          </p:nvPr>
+        </p:nvSpPr>
+        <p:spPr/>
+      </p:sp>
+      <p:sp>
+        <p:nvSpPr>
+          <p:cNvPr id="3" name="מציין מיקום של הערות 2"/>
+          <p:cNvSpPr>
+            <a:spLocks noGrp="1"/>
+          </p:cNvSpPr>
+          <p:nvPr>
+            <p:ph type="body" idx="1"/>
+          </p:nvPr>
+        </p:nvSpPr>
+        <p:spPr/>
+        <p:txBody>
+          <a:bodyPr/>
+          <a:lstStyle/>
+          <a:p>
+            <a:endParaRPr lang="en-IL" dirty="0"/>
+          </a:p>
+        </p:txBody>
+      </p:sp>
+      <p:sp>
+        <p:nvSpPr>
+          <p:cNvPr id="4" name="מציין מיקום של מספר שקופית 3"/>
+          <p:cNvSpPr>
+            <a:spLocks noGrp="1"/>
+          </p:cNvSpPr>
+          <p:nvPr>
+            <p:ph type="sldNum" sz="quarter" idx="5"/>
+          </p:nvPr>
+        </p:nvSpPr>
+        <p:spPr/>
+        <p:txBody>
+          <a:bodyPr/>
+          <a:lstStyle/>
+          <a:p>
+            <a:fld id="{F62FA818-9C27-49D4-BE3F-39305D92C786}" type="slidenum">
+              <a:rPr lang="en-US" smtClean="0"/>
+              <a:t>28</a:t>
+            </a:fld>
+            <a:endParaRPr lang="en-US"/>
+          </a:p>
+        </p:txBody>
+      </p:sp>
+    </p:spTree>
+    <p:extLst>
+      <p:ext uri="{BB962C8B-B14F-4D97-AF65-F5344CB8AC3E}">
+        <p14:creationId xmlns:p14="http://schemas.microsoft.com/office/powerpoint/2010/main" val="1117716614"/>
+      </p:ext>
+    </p:extLst>
+  </p:cSld>
+  <p:clrMapOvr>
+    <a:masterClrMapping/>
+  </p:clrMapOvr>
+</p:notes>
+</file>
+
+<file path=ppt/notesSlides/notesSlide13.xml><?xml version="1.0" encoding="utf-8"?>
+<p:notes xmlns:a="http://schemas.openxmlformats.org/drawingml/2006/main" xmlns:r="http://schemas.openxmlformats.org/officeDocument/2006/relationships" xmlns:p="http://schemas.openxmlformats.org/presentationml/2006/main">
+  <p:cSld>
+    <p:spTree>
+      <p:nvGrpSpPr>
+        <p:cNvPr id="1" name=""/>
+        <p:cNvGrpSpPr/>
+        <p:nvPr/>
+      </p:nvGrpSpPr>
+      <p:grpSpPr>
+        <a:xfrm>
+          <a:off x="0" y="0"/>
+          <a:ext cx="0" cy="0"/>
+          <a:chOff x="0" y="0"/>
+          <a:chExt cx="0" cy="0"/>
+        </a:xfrm>
+      </p:grpSpPr>
+      <p:sp>
+        <p:nvSpPr>
+          <p:cNvPr id="2" name="מציין מיקום של תמונת שקופית 1"/>
+          <p:cNvSpPr>
+            <a:spLocks noGrp="1" noRot="1" noChangeAspect="1"/>
+          </p:cNvSpPr>
+          <p:nvPr>
+            <p:ph type="sldImg"/>
+          </p:nvPr>
+        </p:nvSpPr>
+        <p:spPr/>
+      </p:sp>
+      <p:sp>
+        <p:nvSpPr>
+          <p:cNvPr id="3" name="מציין מיקום של הערות 2"/>
+          <p:cNvSpPr>
+            <a:spLocks noGrp="1"/>
+          </p:cNvSpPr>
+          <p:nvPr>
+            <p:ph type="body" idx="1"/>
+          </p:nvPr>
+        </p:nvSpPr>
+        <p:spPr/>
+        <p:txBody>
+          <a:bodyPr/>
+          <a:lstStyle/>
+          <a:p>
+            <a:endParaRPr lang="en-IL" dirty="0"/>
+          </a:p>
+        </p:txBody>
+      </p:sp>
+      <p:sp>
+        <p:nvSpPr>
+          <p:cNvPr id="4" name="מציין מיקום של מספר שקופית 3"/>
+          <p:cNvSpPr>
+            <a:spLocks noGrp="1"/>
+          </p:cNvSpPr>
+          <p:nvPr>
+            <p:ph type="sldNum" sz="quarter" idx="5"/>
+          </p:nvPr>
+        </p:nvSpPr>
+        <p:spPr/>
+        <p:txBody>
+          <a:bodyPr/>
+          <a:lstStyle/>
+          <a:p>
+            <a:fld id="{F62FA818-9C27-49D4-BE3F-39305D92C786}" type="slidenum">
+              <a:rPr lang="en-US" smtClean="0"/>
+              <a:t>29</a:t>
+            </a:fld>
+            <a:endParaRPr lang="en-US"/>
+          </a:p>
+        </p:txBody>
+      </p:sp>
+    </p:spTree>
+    <p:extLst>
+      <p:ext uri="{BB962C8B-B14F-4D97-AF65-F5344CB8AC3E}">
+        <p14:creationId xmlns:p14="http://schemas.microsoft.com/office/powerpoint/2010/main" val="1510451638"/>
+      </p:ext>
+    </p:extLst>
+  </p:cSld>
+  <p:clrMapOvr>
+    <a:masterClrMapping/>
+  </p:clrMapOvr>
+</p:notes>
+</file>
+
+<file path=ppt/notesSlides/notesSlide14.xml><?xml version="1.0" encoding="utf-8"?>
+<p:notes xmlns:a="http://schemas.openxmlformats.org/drawingml/2006/main" xmlns:r="http://schemas.openxmlformats.org/officeDocument/2006/relationships" xmlns:p="http://schemas.openxmlformats.org/presentationml/2006/main">
+  <p:cSld>
+    <p:spTree>
+      <p:nvGrpSpPr>
+        <p:cNvPr id="1" name=""/>
+        <p:cNvGrpSpPr/>
+        <p:nvPr/>
+      </p:nvGrpSpPr>
+      <p:grpSpPr>
+        <a:xfrm>
+          <a:off x="0" y="0"/>
+          <a:ext cx="0" cy="0"/>
+          <a:chOff x="0" y="0"/>
+          <a:chExt cx="0" cy="0"/>
+        </a:xfrm>
+      </p:grpSpPr>
+      <p:sp>
+        <p:nvSpPr>
+          <p:cNvPr id="2" name="מציין מיקום של תמונת שקופית 1"/>
+          <p:cNvSpPr>
+            <a:spLocks noGrp="1" noRot="1" noChangeAspect="1"/>
+          </p:cNvSpPr>
+          <p:nvPr>
+            <p:ph type="sldImg"/>
+          </p:nvPr>
+        </p:nvSpPr>
+        <p:spPr/>
+      </p:sp>
+      <p:sp>
+        <p:nvSpPr>
+          <p:cNvPr id="3" name="מציין מיקום של הערות 2"/>
+          <p:cNvSpPr>
+            <a:spLocks noGrp="1"/>
+          </p:cNvSpPr>
+          <p:nvPr>
+            <p:ph type="body" idx="1"/>
+          </p:nvPr>
+        </p:nvSpPr>
+        <p:spPr/>
+        <p:txBody>
+          <a:bodyPr/>
+          <a:lstStyle/>
+          <a:p>
+            <a:endParaRPr lang="en-IL" dirty="0"/>
+          </a:p>
+        </p:txBody>
+      </p:sp>
+      <p:sp>
+        <p:nvSpPr>
+          <p:cNvPr id="4" name="מציין מיקום של מספר שקופית 3"/>
+          <p:cNvSpPr>
+            <a:spLocks noGrp="1"/>
+          </p:cNvSpPr>
+          <p:nvPr>
+            <p:ph type="sldNum" sz="quarter" idx="5"/>
+          </p:nvPr>
+        </p:nvSpPr>
+        <p:spPr/>
+        <p:txBody>
+          <a:bodyPr/>
+          <a:lstStyle/>
+          <a:p>
+            <a:fld id="{F62FA818-9C27-49D4-BE3F-39305D92C786}" type="slidenum">
+              <a:rPr lang="en-US" smtClean="0"/>
+              <a:t>30</a:t>
+            </a:fld>
+            <a:endParaRPr lang="en-US"/>
+          </a:p>
+        </p:txBody>
+      </p:sp>
+    </p:spTree>
+    <p:extLst>
+      <p:ext uri="{BB962C8B-B14F-4D97-AF65-F5344CB8AC3E}">
+        <p14:creationId xmlns:p14="http://schemas.microsoft.com/office/powerpoint/2010/main" val="1274398881"/>
+      </p:ext>
+    </p:extLst>
+  </p:cSld>
+  <p:clrMapOvr>
+    <a:masterClrMapping/>
+  </p:clrMapOvr>
+</p:notes>
+</file>
+
+<file path=ppt/notesSlides/notesSlide15.xml><?xml version="1.0" encoding="utf-8"?>
+<p:notes xmlns:a="http://schemas.openxmlformats.org/drawingml/2006/main" xmlns:r="http://schemas.openxmlformats.org/officeDocument/2006/relationships" xmlns:p="http://schemas.openxmlformats.org/presentationml/2006/main">
+  <p:cSld>
+    <p:spTree>
+      <p:nvGrpSpPr>
+        <p:cNvPr id="1" name=""/>
+        <p:cNvGrpSpPr/>
+        <p:nvPr/>
+      </p:nvGrpSpPr>
+      <p:grpSpPr>
+        <a:xfrm>
+          <a:off x="0" y="0"/>
+          <a:ext cx="0" cy="0"/>
+          <a:chOff x="0" y="0"/>
+          <a:chExt cx="0" cy="0"/>
+        </a:xfrm>
+      </p:grpSpPr>
+      <p:sp>
+        <p:nvSpPr>
+          <p:cNvPr id="2" name="Slide Image Placeholder 1"/>
+          <p:cNvSpPr>
+            <a:spLocks noGrp="1" noRot="1" noChangeAspect="1"/>
+          </p:cNvSpPr>
+          <p:nvPr>
+            <p:ph type="sldImg"/>
+          </p:nvPr>
+        </p:nvSpPr>
+        <p:spPr/>
+      </p:sp>
+      <p:sp>
+        <p:nvSpPr>
+          <p:cNvPr id="3" name="Notes Placeholder 2"/>
+          <p:cNvSpPr>
+            <a:spLocks noGrp="1"/>
+          </p:cNvSpPr>
+          <p:nvPr>
+            <p:ph type="body" idx="1"/>
+          </p:nvPr>
+        </p:nvSpPr>
+        <p:spPr/>
+        <p:txBody>
+          <a:bodyPr/>
+          <a:lstStyle/>
+          <a:p>
+            <a:r>
+              <a:rPr lang="en-US" dirty="0"/>
+              <a:t>When we think about ambiguous sentences we generally think about…</a:t>
+            </a:r>
+          </a:p>
+        </p:txBody>
+      </p:sp>
+      <p:sp>
+        <p:nvSpPr>
+          <p:cNvPr id="4" name="Slide Number Placeholder 3"/>
+          <p:cNvSpPr>
+            <a:spLocks noGrp="1"/>
+          </p:cNvSpPr>
+          <p:nvPr>
+            <p:ph type="sldNum" sz="quarter" idx="10"/>
+          </p:nvPr>
+        </p:nvSpPr>
+        <p:spPr/>
+        <p:txBody>
+          <a:bodyPr/>
+          <a:lstStyle/>
+          <a:p>
+            <a:fld id="{AAB75926-57FA-496F-B471-EFDEEEA3DDAD}" type="slidenum">
+              <a:rPr lang="en-US" smtClean="0"/>
+              <a:t>31</a:t>
+            </a:fld>
+            <a:endParaRPr lang="en-US"/>
+          </a:p>
+        </p:txBody>
+      </p:sp>
+    </p:spTree>
+    <p:extLst>
+      <p:ext uri="{BB962C8B-B14F-4D97-AF65-F5344CB8AC3E}">
+        <p14:creationId xmlns:p14="http://schemas.microsoft.com/office/powerpoint/2010/main" val="2156955969"/>
+      </p:ext>
+    </p:extLst>
+  </p:cSld>
+  <p:clrMapOvr>
+    <a:masterClrMapping/>
+  </p:clrMapOvr>
+</p:notes>
+</file>
+
 <file path=ppt/notesSlides/notesSlide2.xml><?xml version="1.0" encoding="utf-8"?>
 <p:notes xmlns:a="http://schemas.openxmlformats.org/drawingml/2006/main" xmlns:r="http://schemas.openxmlformats.org/officeDocument/2006/relationships" xmlns:p="http://schemas.openxmlformats.org/presentationml/2006/main">
   <p:cSld>
@@ -1245,6 +1752,13 @@
               </a:rPr>
               <a:t>If anyone criticizes AI, say that Turing first did Turing machine and then AI</a:t>
             </a:r>
+            <a:endParaRPr lang="he-IL" dirty="0"/>
+          </a:p>
+          <a:p>
+            <a:r>
+              <a:rPr lang="he-IL" dirty="0"/>
+              <a:t> </a:t>
+            </a:r>
             <a:endParaRPr lang="en-US" dirty="0"/>
           </a:p>
         </p:txBody>
@@ -1304,7 +1818,7 @@
       </p:grpSpPr>
       <p:sp>
         <p:nvSpPr>
-          <p:cNvPr id="2" name="Slide Image Placeholder 1"/>
+          <p:cNvPr id="2" name="מציין מיקום של תמונת שקופית 1"/>
           <p:cNvSpPr>
             <a:spLocks noGrp="1" noRot="1" noChangeAspect="1"/>
           </p:cNvSpPr>
@@ -1316,7 +1830,7 @@
       </p:sp>
       <p:sp>
         <p:nvSpPr>
-          <p:cNvPr id="3" name="Notes Placeholder 2"/>
+          <p:cNvPr id="3" name="מציין מיקום של הערות 2"/>
           <p:cNvSpPr>
             <a:spLocks noGrp="1"/>
           </p:cNvSpPr>
@@ -1329,29 +1843,18 @@
           <a:bodyPr/>
           <a:lstStyle/>
           <a:p>
-            <a:r>
-              <a:rPr lang="en-US" dirty="0"/>
-              <a:t>When we think </a:t>
-            </a:r>
-            <a:r>
-              <a:rPr lang="en-US"/>
-              <a:t>about ambiguous </a:t>
-            </a:r>
-            <a:r>
-              <a:rPr lang="en-US" dirty="0"/>
-              <a:t>sentences we generally think about…</a:t>
-            </a:r>
-          </a:p>
-        </p:txBody>
-      </p:sp>
-      <p:sp>
-        <p:nvSpPr>
-          <p:cNvPr id="4" name="Slide Number Placeholder 3"/>
-          <p:cNvSpPr>
-            <a:spLocks noGrp="1"/>
-          </p:cNvSpPr>
-          <p:nvPr>
-            <p:ph type="sldNum" sz="quarter" idx="10"/>
+            <a:endParaRPr lang="en-IL" dirty="0"/>
+          </a:p>
+        </p:txBody>
+      </p:sp>
+      <p:sp>
+        <p:nvSpPr>
+          <p:cNvPr id="4" name="מציין מיקום של מספר שקופית 3"/>
+          <p:cNvSpPr>
+            <a:spLocks noGrp="1"/>
+          </p:cNvSpPr>
+          <p:nvPr>
+            <p:ph type="sldNum" sz="quarter" idx="5"/>
           </p:nvPr>
         </p:nvSpPr>
         <p:spPr/>
@@ -1359,9 +1862,9 @@
           <a:bodyPr/>
           <a:lstStyle/>
           <a:p>
-            <a:fld id="{AAB75926-57FA-496F-B471-EFDEEEA3DDAD}" type="slidenum">
+            <a:fld id="{F62FA818-9C27-49D4-BE3F-39305D92C786}" type="slidenum">
               <a:rPr lang="en-US" smtClean="0"/>
-              <a:t>31</a:t>
+              <a:t>25</a:t>
             </a:fld>
             <a:endParaRPr lang="en-US"/>
           </a:p>
@@ -1370,7 +1873,7 @@
     </p:spTree>
     <p:extLst>
       <p:ext uri="{BB962C8B-B14F-4D97-AF65-F5344CB8AC3E}">
-        <p14:creationId xmlns:p14="http://schemas.microsoft.com/office/powerpoint/2010/main" val="2156955969"/>
+        <p14:creationId xmlns:p14="http://schemas.microsoft.com/office/powerpoint/2010/main" val="3587239811"/>
       </p:ext>
     </p:extLst>
   </p:cSld>
@@ -1560,7 +2063,7 @@
             <a:fld id="{1D8BD707-D9CF-40AE-B4C6-C98DA3205C09}" type="datetimeFigureOut">
               <a:rPr lang="en-US" smtClean="0"/>
               <a:pPr/>
-              <a:t>10/10/2021</a:t>
+              <a:t>10/18/2022</a:t>
             </a:fld>
             <a:endParaRPr lang="en-US"/>
           </a:p>
@@ -1725,7 +2228,7 @@
             <a:fld id="{1D8BD707-D9CF-40AE-B4C6-C98DA3205C09}" type="datetimeFigureOut">
               <a:rPr lang="en-US" smtClean="0"/>
               <a:pPr/>
-              <a:t>10/10/2021</a:t>
+              <a:t>10/18/2022</a:t>
             </a:fld>
             <a:endParaRPr lang="en-US"/>
           </a:p>
@@ -1900,7 +2403,7 @@
             <a:fld id="{1D8BD707-D9CF-40AE-B4C6-C98DA3205C09}" type="datetimeFigureOut">
               <a:rPr lang="en-US" smtClean="0"/>
               <a:pPr/>
-              <a:t>10/10/2021</a:t>
+              <a:t>10/18/2022</a:t>
             </a:fld>
             <a:endParaRPr lang="en-US"/>
           </a:p>
@@ -2065,7 +2568,7 @@
             <a:fld id="{1D8BD707-D9CF-40AE-B4C6-C98DA3205C09}" type="datetimeFigureOut">
               <a:rPr lang="en-US" smtClean="0"/>
               <a:pPr/>
-              <a:t>10/10/2021</a:t>
+              <a:t>10/18/2022</a:t>
             </a:fld>
             <a:endParaRPr lang="en-US"/>
           </a:p>
@@ -2307,7 +2810,7 @@
             <a:fld id="{1D8BD707-D9CF-40AE-B4C6-C98DA3205C09}" type="datetimeFigureOut">
               <a:rPr lang="en-US" smtClean="0"/>
               <a:pPr/>
-              <a:t>10/10/2021</a:t>
+              <a:t>10/18/2022</a:t>
             </a:fld>
             <a:endParaRPr lang="en-US"/>
           </a:p>
@@ -2589,7 +3092,7 @@
             <a:fld id="{1D8BD707-D9CF-40AE-B4C6-C98DA3205C09}" type="datetimeFigureOut">
               <a:rPr lang="en-US" smtClean="0"/>
               <a:pPr/>
-              <a:t>10/10/2021</a:t>
+              <a:t>10/18/2022</a:t>
             </a:fld>
             <a:endParaRPr lang="en-US"/>
           </a:p>
@@ -3005,7 +3508,7 @@
             <a:fld id="{1D8BD707-D9CF-40AE-B4C6-C98DA3205C09}" type="datetimeFigureOut">
               <a:rPr lang="en-US" smtClean="0"/>
               <a:pPr/>
-              <a:t>10/10/2021</a:t>
+              <a:t>10/18/2022</a:t>
             </a:fld>
             <a:endParaRPr lang="en-US"/>
           </a:p>
@@ -3119,7 +3622,7 @@
             <a:fld id="{1D8BD707-D9CF-40AE-B4C6-C98DA3205C09}" type="datetimeFigureOut">
               <a:rPr lang="en-US" smtClean="0"/>
               <a:pPr/>
-              <a:t>10/10/2021</a:t>
+              <a:t>10/18/2022</a:t>
             </a:fld>
             <a:endParaRPr lang="en-US"/>
           </a:p>
@@ -3211,7 +3714,7 @@
             <a:fld id="{1D8BD707-D9CF-40AE-B4C6-C98DA3205C09}" type="datetimeFigureOut">
               <a:rPr lang="en-US" smtClean="0"/>
               <a:pPr/>
-              <a:t>10/10/2021</a:t>
+              <a:t>10/18/2022</a:t>
             </a:fld>
             <a:endParaRPr lang="en-US"/>
           </a:p>
@@ -3483,7 +3986,7 @@
             <a:fld id="{1D8BD707-D9CF-40AE-B4C6-C98DA3205C09}" type="datetimeFigureOut">
               <a:rPr lang="en-US" smtClean="0"/>
               <a:pPr/>
-              <a:t>10/10/2021</a:t>
+              <a:t>10/18/2022</a:t>
             </a:fld>
             <a:endParaRPr lang="en-US"/>
           </a:p>
@@ -3732,7 +4235,7 @@
             <a:fld id="{1D8BD707-D9CF-40AE-B4C6-C98DA3205C09}" type="datetimeFigureOut">
               <a:rPr lang="en-US" smtClean="0"/>
               <a:pPr/>
-              <a:t>10/10/2021</a:t>
+              <a:t>10/18/2022</a:t>
             </a:fld>
             <a:endParaRPr lang="en-US"/>
           </a:p>
@@ -3940,7 +4443,7 @@
             <a:fld id="{1D8BD707-D9CF-40AE-B4C6-C98DA3205C09}" type="datetimeFigureOut">
               <a:rPr lang="en-US" smtClean="0"/>
               <a:pPr/>
-              <a:t>10/10/2021</a:t>
+              <a:t>10/18/2022</a:t>
             </a:fld>
             <a:endParaRPr lang="en-US"/>
           </a:p>
@@ -4353,6 +4856,12 @@
               <a:t>Amos Azaria</a:t>
             </a:r>
           </a:p>
+          <a:p>
+            <a:r>
+              <a:rPr lang="en-US" dirty="0"/>
+              <a:t>(Avigail Stekel)</a:t>
+            </a:r>
+          </a:p>
         </p:txBody>
       </p:sp>
     </p:spTree>
@@ -4369,7 +4878,7 @@
 </file>
 
 <file path=ppt/slides/slide10.xml><?xml version="1.0" encoding="utf-8"?>
-<p:sld xmlns:a="http://schemas.openxmlformats.org/drawingml/2006/main" xmlns:r="http://schemas.openxmlformats.org/officeDocument/2006/relationships" xmlns:p="http://schemas.openxmlformats.org/presentationml/2006/main">
+<p:sld xmlns:a="http://schemas.openxmlformats.org/drawingml/2006/main" xmlns:r="http://schemas.openxmlformats.org/officeDocument/2006/relationships" xmlns:p="http://schemas.openxmlformats.org/presentationml/2006/main" show="0">
   <p:cSld>
     <p:spTree>
       <p:nvGrpSpPr>
@@ -4608,7 +5117,7 @@
         </p:blipFill>
         <p:spPr bwMode="auto">
           <a:xfrm>
-            <a:off x="2209800" y="5775959"/>
+            <a:off x="5072808" y="5843904"/>
             <a:ext cx="1066800" cy="929641"/>
           </a:xfrm>
           <a:prstGeom prst="rect">
@@ -4833,7 +5342,7 @@
         </p:nvSpPr>
         <p:spPr>
           <a:xfrm>
-            <a:off x="3581400" y="5854616"/>
+            <a:off x="6477000" y="5946228"/>
             <a:ext cx="1981200" cy="762000"/>
           </a:xfrm>
           <a:prstGeom prst="ellipse">
@@ -4866,6 +5375,72 @@
               <a:t>משווה!</a:t>
             </a:r>
             <a:endParaRPr lang="en-US" sz="3200" dirty="0"/>
+          </a:p>
+        </p:txBody>
+      </p:sp>
+      <p:sp>
+        <p:nvSpPr>
+          <p:cNvPr id="8" name="Rectangle 7">
+            <a:extLst>
+              <a:ext uri="{FF2B5EF4-FFF2-40B4-BE49-F238E27FC236}">
+                <a16:creationId xmlns:a16="http://schemas.microsoft.com/office/drawing/2014/main" id="{8DFED5E6-A416-427B-A4AF-F67EBCD8B40A}"/>
+              </a:ext>
+            </a:extLst>
+          </p:cNvPr>
+          <p:cNvSpPr/>
+          <p:nvPr/>
+        </p:nvSpPr>
+        <p:spPr>
+          <a:xfrm>
+            <a:off x="381000" y="5638800"/>
+            <a:ext cx="4495800" cy="1137136"/>
+          </a:xfrm>
+          <a:prstGeom prst="rect">
+            <a:avLst/>
+          </a:prstGeom>
+        </p:spPr>
+        <p:style>
+          <a:lnRef idx="2">
+            <a:schemeClr val="accent1">
+              <a:shade val="50000"/>
+            </a:schemeClr>
+          </a:lnRef>
+          <a:fillRef idx="1">
+            <a:schemeClr val="accent1"/>
+          </a:fillRef>
+          <a:effectRef idx="0">
+            <a:schemeClr val="accent1"/>
+          </a:effectRef>
+          <a:fontRef idx="minor">
+            <a:schemeClr val="lt1"/>
+          </a:fontRef>
+        </p:style>
+        <p:txBody>
+          <a:bodyPr rtlCol="0" anchor="ctr"/>
+          <a:lstStyle/>
+          <a:p>
+            <a:pPr algn="ctr" rtl="1"/>
+            <a:r>
+              <a:rPr lang="he-IL" sz="2400" dirty="0"/>
+              <a:t>בדר"כ לשון </a:t>
+            </a:r>
+            <a:r>
+              <a:rPr lang="he-IL" sz="2400" b="1" dirty="0"/>
+              <a:t>יחיד</a:t>
+            </a:r>
+            <a:r>
+              <a:rPr lang="he-IL" sz="2400" dirty="0"/>
+              <a:t>ה מחביאה בתוכה לשון יחיד. </a:t>
+            </a:r>
+            <a:r>
+              <a:rPr lang="he-IL" sz="2400" b="1" dirty="0"/>
+              <a:t>אמר</a:t>
+            </a:r>
+            <a:r>
+              <a:rPr lang="he-IL" sz="2400" dirty="0"/>
+              <a:t>ה כותב/ת וכד'</a:t>
+            </a:r>
+            <a:endParaRPr lang="en-US" sz="2400" dirty="0"/>
           </a:p>
         </p:txBody>
       </p:sp>
@@ -5334,6 +5909,59 @@
                       </p:childTnLst>
                     </p:cTn>
                   </p:par>
+                  <p:par>
+                    <p:cTn id="42" fill="hold">
+                      <p:stCondLst>
+                        <p:cond delay="indefinite"/>
+                      </p:stCondLst>
+                      <p:childTnLst>
+                        <p:par>
+                          <p:cTn id="43" fill="hold">
+                            <p:stCondLst>
+                              <p:cond delay="0"/>
+                            </p:stCondLst>
+                            <p:childTnLst>
+                              <p:par>
+                                <p:cTn id="44" presetID="10" presetClass="entr" presetSubtype="0" fill="hold" grpId="0" nodeType="clickEffect">
+                                  <p:stCondLst>
+                                    <p:cond delay="0"/>
+                                  </p:stCondLst>
+                                  <p:childTnLst>
+                                    <p:set>
+                                      <p:cBhvr>
+                                        <p:cTn id="45" dur="1" fill="hold">
+                                          <p:stCondLst>
+                                            <p:cond delay="0"/>
+                                          </p:stCondLst>
+                                        </p:cTn>
+                                        <p:tgtEl>
+                                          <p:spTgt spid="8"/>
+                                        </p:tgtEl>
+                                        <p:attrNameLst>
+                                          <p:attrName>style.visibility</p:attrName>
+                                        </p:attrNameLst>
+                                      </p:cBhvr>
+                                      <p:to>
+                                        <p:strVal val="visible"/>
+                                      </p:to>
+                                    </p:set>
+                                    <p:animEffect transition="in" filter="fade">
+                                      <p:cBhvr>
+                                        <p:cTn id="46" dur="500"/>
+                                        <p:tgtEl>
+                                          <p:spTgt spid="8"/>
+                                        </p:tgtEl>
+                                      </p:cBhvr>
+                                    </p:animEffect>
+                                  </p:childTnLst>
+                                </p:cTn>
+                              </p:par>
+                            </p:childTnLst>
+                          </p:cTn>
+                        </p:par>
+                      </p:childTnLst>
+                    </p:cTn>
+                  </p:par>
                 </p:childTnLst>
               </p:cTn>
               <p:prevCondLst>
@@ -5360,6 +5988,7 @@
       <p:bldP spid="9" grpId="0" animBg="1"/>
       <p:bldP spid="11" grpId="0" animBg="1"/>
       <p:bldP spid="12" grpId="0" animBg="1"/>
+      <p:bldP spid="8" grpId="0" animBg="1"/>
     </p:bldLst>
   </p:timing>
 </p:sld>
@@ -5500,6 +6129,11 @@
               <a:rPr lang="en-US" dirty="0"/>
               <a:t>Machine Learning</a:t>
             </a:r>
+            <a:endParaRPr lang="he-IL" dirty="0"/>
+          </a:p>
+          <a:p>
+            <a:pPr algn="ctr"/>
+            <a:endParaRPr lang="en-US" dirty="0"/>
           </a:p>
         </p:txBody>
       </p:sp>
@@ -5511,7 +6145,7 @@
         </p:nvSpPr>
         <p:spPr>
           <a:xfrm>
-            <a:off x="3276600" y="5257800"/>
+            <a:off x="3276600" y="5139104"/>
             <a:ext cx="1447800" cy="753208"/>
           </a:xfrm>
           <a:prstGeom prst="ellipse">
@@ -7070,7 +7704,7 @@
         <p:spPr/>
         <p:txBody>
           <a:bodyPr>
-            <a:normAutofit fontScale="92500" lnSpcReduction="10000"/>
+            <a:normAutofit lnSpcReduction="10000"/>
           </a:bodyPr>
           <a:lstStyle/>
           <a:p>
@@ -7095,48 +7729,40 @@
               <a:t>http://www.deeplearningbook.org/</a:t>
             </a:r>
             <a:r>
-              <a:rPr lang="en-US" dirty="0"/>
-              <a:t>, or download a </a:t>
-            </a:r>
-            <a:r>
-              <a:rPr lang="en-US" dirty="0" err="1"/>
-              <a:t>pdf</a:t>
-            </a:r>
-            <a:r>
-              <a:rPr lang="en-US" dirty="0"/>
-              <a:t> from: </a:t>
+              <a:rPr lang="en-US" u="sng" dirty="0"/>
+              <a:t>)</a:t>
+            </a:r>
+            <a:r>
+              <a:rPr lang="en-US" dirty="0"/>
+              <a:t> </a:t>
+            </a:r>
+          </a:p>
+          <a:p>
+            <a:r>
+              <a:rPr lang="en-US" dirty="0"/>
+              <a:t>TensorFlow: </a:t>
             </a:r>
             <a:r>
               <a:rPr lang="en-US" u="sng" dirty="0">
                 <a:hlinkClick r:id="rId4"/>
               </a:rPr>
-              <a:t>https://github.com/HFTrader/DeepLearningBook/blob/master/DeepLearningBook.pdf</a:t>
-            </a:r>
-            <a:r>
-              <a:rPr lang="en-US" dirty="0"/>
-              <a:t>)  </a:t>
-            </a:r>
-          </a:p>
-          <a:p>
-            <a:r>
-              <a:rPr lang="en-US" dirty="0"/>
-              <a:t>TensorFlow: </a:t>
-            </a:r>
-            <a:r>
-              <a:rPr lang="en-US" u="sng" dirty="0">
+              <a:t>https://www.tensorflow.org/tutorials</a:t>
+            </a:r>
+            <a:r>
+              <a:rPr lang="en-US" dirty="0"/>
+              <a:t> </a:t>
+            </a:r>
+          </a:p>
+          <a:p>
+            <a:r>
+              <a:rPr lang="en-US" dirty="0"/>
+              <a:t>Deep learning in Hebrew: </a:t>
+            </a:r>
+            <a:r>
+              <a:rPr lang="en-US" dirty="0">
                 <a:hlinkClick r:id="rId5"/>
               </a:rPr>
-              <a:t>https://www.tensorflow.org/get_started/get_started</a:t>
-            </a:r>
-            <a:r>
-              <a:rPr lang="en-US" dirty="0"/>
-              <a:t> and </a:t>
-            </a:r>
-            <a:r>
-              <a:rPr lang="en-US" u="sng" dirty="0">
-                <a:hlinkClick r:id="rId6"/>
-              </a:rPr>
-              <a:t>https://www.tensorflow.org/tutorials</a:t>
+              <a:t>https://github.com/AvrahamRaviv/Deep-Learning-in-Hebrew</a:t>
             </a:r>
             <a:r>
               <a:rPr lang="en-US" dirty="0"/>
@@ -8908,7 +9534,7 @@
           <a:p>
             <a:r>
               <a:rPr lang="en-US" dirty="0"/>
-              <a:t>Amos Azaria</a:t>
+              <a:t>Avigail Stekel</a:t>
             </a:r>
           </a:p>
           <a:p>
@@ -8921,43 +9547,30 @@
             <a:pPr lvl="1"/>
             <a:r>
               <a:rPr lang="en-US" dirty="0"/>
-              <a:t>Sunday 17:00-20:00</a:t>
+              <a:t>Monday 9:00-12:00</a:t>
             </a:r>
           </a:p>
           <a:p>
             <a:pPr lvl="1"/>
             <a:r>
               <a:rPr lang="en-US" dirty="0"/>
-              <a:t>Monday 9:00-12:00</a:t>
-            </a:r>
-          </a:p>
-          <a:p>
-            <a:r>
-              <a:rPr lang="en-US" dirty="0"/>
-              <a:t>Email: </a:t>
-            </a:r>
-            <a:r>
-              <a:rPr lang="en-US" dirty="0">
-                <a:hlinkClick r:id="rId2"/>
-              </a:rPr>
-              <a:t>amos.azaria@ariel.ac.il</a:t>
-            </a:r>
-            <a:r>
-              <a:rPr lang="en-US" dirty="0"/>
-              <a:t> .</a:t>
-            </a:r>
-          </a:p>
-          <a:p>
-            <a:r>
-              <a:rPr lang="en-US" dirty="0"/>
-              <a:t>Reception hours: TBD (probably Sunday 16:00)</a:t>
-            </a:r>
-          </a:p>
-          <a:p>
-            <a:r>
-              <a:rPr lang="en-US" dirty="0"/>
-              <a:t>Office: 11.2.11</a:t>
-            </a:r>
+              <a:t>Monday 12:00-15:00</a:t>
+            </a:r>
+          </a:p>
+          <a:p>
+            <a:r>
+              <a:rPr lang="en-US" dirty="0"/>
+              <a:t>Email: Avigail.st@gmail.com .</a:t>
+            </a:r>
+          </a:p>
+          <a:p>
+            <a:r>
+              <a:rPr lang="en-US" dirty="0"/>
+              <a:t>Reception hours: TBD (probably Wednesday 10:00)</a:t>
+            </a:r>
+          </a:p>
+          <a:p>
+            <a:endParaRPr lang="en-US" dirty="0"/>
           </a:p>
         </p:txBody>
       </p:sp>
@@ -9222,17 +9835,23 @@
             </a:pPr>
             <a:r>
               <a:rPr lang="en-US" sz="2400" dirty="0"/>
-              <a:t>(First Chapter: </a:t>
-            </a:r>
-            <a:r>
-              <a:rPr lang="en-US" sz="2400" u="sng" dirty="0">
+              <a:t>(First Chapter:</a:t>
+            </a:r>
+            <a:r>
+              <a:rPr lang="en-US" sz="1600" dirty="0">
                 <a:hlinkClick r:id="rId2"/>
               </a:rPr>
-              <a:t>http://www.cs.colorado.edu/~martin/SLP/slp-ch1.pdf</a:t>
+              <a:t> </a:t>
+            </a:r>
+            <a:r>
+              <a:rPr lang="en-US" sz="2400" dirty="0">
+                <a:hlinkClick r:id="rId2"/>
+              </a:rPr>
+              <a:t>Speech and Language Processing (stanford.edu</a:t>
             </a:r>
             <a:r>
               <a:rPr lang="en-US" sz="2400" dirty="0"/>
-              <a:t> )</a:t>
+              <a:t>) )</a:t>
             </a:r>
           </a:p>
           <a:p>
@@ -9672,7 +10291,7 @@
           <p:nvPr/>
         </p:nvPicPr>
         <p:blipFill>
-          <a:blip r:embed="rId2"/>
+          <a:blip r:embed="rId3"/>
           <a:stretch>
             <a:fillRect/>
           </a:stretch>
@@ -9702,7 +10321,7 @@
           <p:nvPr/>
         </p:nvPicPr>
         <p:blipFill>
-          <a:blip r:embed="rId3"/>
+          <a:blip r:embed="rId4"/>
           <a:stretch>
             <a:fillRect/>
           </a:stretch>
@@ -9923,20 +10542,72 @@
           <a:p>
             <a:r>
               <a:rPr lang="en-US" dirty="0">
-                <a:hlinkClick r:id="rId2" action="ppaction://hlinkfile"/>
+                <a:hlinkClick r:id="rId3" action="ppaction://hlinkfile"/>
               </a:rPr>
-              <a:t>File://D:/tempVideos/MindField/romanTech.mp4</a:t>
+              <a:t>File://D:/tempVideos/MindField/romanTechAll.mp4</a:t>
             </a:r>
             <a:endParaRPr lang="en-US" dirty="0"/>
           </a:p>
           <a:p>
             <a:r>
               <a:rPr lang="en-US" dirty="0"/>
-              <a:t>For full episode, see: https://www.youtube.com/watch?v=qZXpgf8N6hs</a:t>
-            </a:r>
-          </a:p>
-        </p:txBody>
-      </p:sp>
+              <a:t>For full episode, see: </a:t>
+            </a:r>
+            <a:r>
+              <a:rPr lang="en-US" dirty="0">
+                <a:hlinkClick r:id="rId4"/>
+              </a:rPr>
+              <a:t>https://www.youtube.com/watch?v=qZXpgf8N6hs</a:t>
+            </a:r>
+            <a:r>
+              <a:rPr lang="en-US" dirty="0"/>
+              <a:t> </a:t>
+            </a:r>
+          </a:p>
+          <a:p>
+            <a:r>
+              <a:rPr lang="en-US" dirty="0">
+                <a:hlinkClick r:id="rId5"/>
+              </a:rPr>
+              <a:t>https://www.cleverbot.com/</a:t>
+            </a:r>
+            <a:r>
+              <a:rPr lang="en-US" dirty="0"/>
+              <a:t> </a:t>
+            </a:r>
+          </a:p>
+        </p:txBody>
+      </p:sp>
+      <p:pic>
+        <p:nvPicPr>
+          <p:cNvPr id="5" name="Picture 4">
+            <a:extLst>
+              <a:ext uri="{FF2B5EF4-FFF2-40B4-BE49-F238E27FC236}">
+                <a16:creationId xmlns:a16="http://schemas.microsoft.com/office/drawing/2014/main" id="{C9D93139-3C43-4553-A753-94D05C3A5501}"/>
+              </a:ext>
+            </a:extLst>
+          </p:cNvPr>
+          <p:cNvPicPr>
+            <a:picLocks noChangeAspect="1"/>
+          </p:cNvPicPr>
+          <p:nvPr/>
+        </p:nvPicPr>
+        <p:blipFill>
+          <a:blip r:embed="rId6"/>
+          <a:stretch>
+            <a:fillRect/>
+          </a:stretch>
+        </p:blipFill>
+        <p:spPr>
+          <a:xfrm>
+            <a:off x="4800600" y="2258920"/>
+            <a:ext cx="4343400" cy="4522879"/>
+          </a:xfrm>
+          <a:prstGeom prst="rect">
+            <a:avLst/>
+          </a:prstGeom>
+        </p:spPr>
+      </p:pic>
     </p:spTree>
     <p:extLst>
       <p:ext uri="{BB962C8B-B14F-4D97-AF65-F5344CB8AC3E}">
@@ -10021,7 +10692,7 @@
           </p:nvPr>
         </p:nvPicPr>
         <p:blipFill>
-          <a:blip r:embed="rId2">
+          <a:blip r:embed="rId3">
             <a:extLst>
               <a:ext uri="{28A0092B-C50C-407E-A947-70E740481C1C}">
                 <a14:useLocalDpi xmlns:a14="http://schemas.microsoft.com/office/drawing/2010/main" val="0"/>
@@ -10393,14 +11064,14 @@
               <a:t>How many drops are in the ocean?</a:t>
             </a:r>
             <a:endParaRPr lang="en-US" sz="2000" dirty="0">
-              <a:hlinkClick r:id="rId2"/>
+              <a:hlinkClick r:id="rId3"/>
             </a:endParaRPr>
           </a:p>
           <a:p>
             <a:pPr lvl="1"/>
             <a:r>
               <a:rPr lang="en-US" sz="1600" dirty="0">
-                <a:hlinkClick r:id="rId2"/>
+                <a:hlinkClick r:id="rId3"/>
               </a:rPr>
               <a:t>https://youtu.be/4ITzgO9CBzU</a:t>
             </a:r>
@@ -10414,7 +11085,7 @@
             <a:endParaRPr lang="en-US" sz="2000" b="0" i="0" u="none" strike="noStrike" dirty="0">
               <a:effectLst/>
               <a:latin typeface="Roboto"/>
-              <a:hlinkClick r:id="rId3"/>
+              <a:hlinkClick r:id="rId4"/>
             </a:endParaRPr>
           </a:p>
           <a:p>
@@ -10423,7 +11094,7 @@
               <a:rPr lang="en-US" sz="1600" b="0" i="0" u="none" strike="noStrike" dirty="0">
                 <a:effectLst/>
                 <a:latin typeface="Roboto"/>
-                <a:hlinkClick r:id="rId3"/>
+                <a:hlinkClick r:id="rId4"/>
               </a:rPr>
               <a:t>https://youtu.be/Y7_ecFYhzHg</a:t>
             </a:r>
@@ -10455,7 +11126,7 @@
           <p:nvPr/>
         </p:nvPicPr>
         <p:blipFill>
-          <a:blip r:embed="rId4"/>
+          <a:blip r:embed="rId5"/>
           <a:stretch>
             <a:fillRect/>
           </a:stretch>
@@ -11083,7 +11754,7 @@
         <p:spPr/>
         <p:txBody>
           <a:bodyPr>
-            <a:normAutofit fontScale="92500" lnSpcReduction="10000"/>
+            <a:normAutofit fontScale="92500" lnSpcReduction="20000"/>
           </a:bodyPr>
           <a:lstStyle/>
           <a:p>
@@ -11131,6 +11802,13 @@
             <a:r>
               <a:rPr lang="en-US" dirty="0"/>
               <a:t>They ate spaghetti with pajamas</a:t>
+            </a:r>
+          </a:p>
+          <a:p>
+            <a:pPr lvl="1"/>
+            <a:r>
+              <a:rPr lang="en-US" dirty="0"/>
+              <a:t>They ate spaghetti with friends</a:t>
             </a:r>
           </a:p>
           <a:p>
@@ -11522,7 +12200,7 @@
             </a:r>
             <a:r>
               <a:rPr lang="en-US" dirty="0"/>
-              <a:t> / thesis (either with me or with someone else).</a:t>
+              <a:t> / thesis .</a:t>
             </a:r>
           </a:p>
           <a:p>
@@ -11639,8 +12317,21 @@
             </a:pPr>
             <a:r>
               <a:rPr lang="en-US" dirty="0"/>
-              <a:t>1) 5% Proposal: 1/11/21</a:t>
-            </a:r>
+              <a:t>1) 5% Proposal: </a:t>
+            </a:r>
+            <a:r>
+              <a:rPr lang="he-IL" dirty="0"/>
+              <a:t>3</a:t>
+            </a:r>
+            <a:r>
+              <a:rPr lang="en-US" dirty="0"/>
+              <a:t>/11/2</a:t>
+            </a:r>
+            <a:r>
+              <a:rPr lang="he-IL" dirty="0"/>
+              <a:t>2</a:t>
+            </a:r>
+            <a:endParaRPr lang="en-US" dirty="0"/>
           </a:p>
           <a:p>
             <a:pPr lvl="2"/>
@@ -11655,8 +12346,21 @@
             </a:pPr>
             <a:r>
               <a:rPr lang="en-US" dirty="0"/>
-              <a:t>2) 10% MLP  29/11/21</a:t>
-            </a:r>
+              <a:t>2) 10% MLP  </a:t>
+            </a:r>
+            <a:r>
+              <a:rPr lang="he-IL" dirty="0"/>
+              <a:t>1/12</a:t>
+            </a:r>
+            <a:r>
+              <a:rPr lang="en-US" dirty="0"/>
+              <a:t>/2</a:t>
+            </a:r>
+            <a:r>
+              <a:rPr lang="he-IL" dirty="0"/>
+              <a:t>2</a:t>
+            </a:r>
+            <a:endParaRPr lang="en-US" dirty="0"/>
           </a:p>
           <a:p>
             <a:pPr lvl="2"/>
@@ -11679,8 +12383,21 @@
             </a:pPr>
             <a:r>
               <a:rPr lang="en-US" dirty="0"/>
-              <a:t>3) 25% Presentation + report (CNN / RNN / Reinforcement etc.). 2-3/1/22</a:t>
-            </a:r>
+              <a:t>3) 25% Presentation + report (CNN / RNN / Reinforcement etc.). 2-</a:t>
+            </a:r>
+            <a:r>
+              <a:rPr lang="he-IL" dirty="0"/>
+              <a:t>6</a:t>
+            </a:r>
+            <a:r>
+              <a:rPr lang="en-US" dirty="0"/>
+              <a:t>/1/2</a:t>
+            </a:r>
+            <a:r>
+              <a:rPr lang="he-IL" dirty="0"/>
+              <a:t>3</a:t>
+            </a:r>
+            <a:endParaRPr lang="en-US" dirty="0"/>
           </a:p>
           <a:p>
             <a:pPr lvl="2"/>
@@ -11724,7 +12441,7 @@
 </file>
 
 <file path=ppt/slides/slide8.xml><?xml version="1.0" encoding="utf-8"?>
-<p:sld xmlns:a="http://schemas.openxmlformats.org/drawingml/2006/main" xmlns:r="http://schemas.openxmlformats.org/officeDocument/2006/relationships" xmlns:p="http://schemas.openxmlformats.org/presentationml/2006/main">
+<p:sld xmlns:a="http://schemas.openxmlformats.org/drawingml/2006/main" xmlns:r="http://schemas.openxmlformats.org/officeDocument/2006/relationships" xmlns:p="http://schemas.openxmlformats.org/presentationml/2006/main" show="0">
   <p:cSld>
     <p:spTree>
       <p:nvGrpSpPr>

</xml_diff>